<commit_message>
done lab6 report & all
</commit_message>
<xml_diff>
--- a/lab7-Flask/lab7-Flask.pptx
+++ b/lab7-Flask/lab7-Flask.pptx
@@ -216,7 +216,7 @@
           <a:p>
             <a:fld id="{3CB4DFE6-19B7-45E1-ABC7-CD6B65AA846C}" type="datetimeFigureOut">
               <a:rPr lang="en-US" smtClean="0"/>
-              <a:t>2020-10-17</a:t>
+              <a:t>10/26/2021</a:t>
             </a:fld>
             <a:endParaRPr lang="en-US"/>
           </a:p>
@@ -676,7 +676,7 @@
           <a:p>
             <a:fld id="{D9AC18CD-CBFF-4F16-991F-7F44B13A7A19}" type="datetime1">
               <a:rPr lang="en-US" smtClean="0"/>
-              <a:t>2020-10-17</a:t>
+              <a:t>10/26/2021</a:t>
             </a:fld>
             <a:endParaRPr lang="en-US"/>
           </a:p>
@@ -1145,7 +1145,7 @@
           <a:p>
             <a:fld id="{438BDDBE-63F2-4029-93CB-1FD36FC0CE69}" type="datetime1">
               <a:rPr lang="en-US" smtClean="0"/>
-              <a:t>2020-10-17</a:t>
+              <a:t>10/26/2021</a:t>
             </a:fld>
             <a:endParaRPr lang="en-US"/>
           </a:p>
@@ -1367,7 +1367,7 @@
           <a:p>
             <a:fld id="{DF38C4BE-9E29-43C6-AAAE-97E97D06273F}" type="datetime1">
               <a:rPr lang="en-US" smtClean="0"/>
-              <a:t>2020-10-17</a:t>
+              <a:t>10/26/2021</a:t>
             </a:fld>
             <a:endParaRPr lang="en-US"/>
           </a:p>
@@ -4084,8 +4084,8 @@
         </p:blipFill>
         <p:spPr>
           <a:xfrm>
-            <a:off x="1648772" y="2905533"/>
-            <a:ext cx="3880760" cy="3778054"/>
+            <a:off x="583035" y="3143296"/>
+            <a:ext cx="6881274" cy="6699158"/>
           </a:xfrm>
           <a:prstGeom prst="rect">
             <a:avLst/>

</xml_diff>